<commit_message>
Exception handling finished + update presentation
Also updated archive
</commit_message>
<xml_diff>
--- a/Team Erbium Presentation.pptx
+++ b/Team Erbium Presentation.pptx
@@ -302,7 +302,7 @@
             <a:fld id="{3BF7C7B5-275F-4D1F-9AB4-9255447DBC73}" type="datetimeFigureOut">
               <a:rPr lang="en-US"/>
               <a:pPr/>
-              <a:t>5/16/2013</a:t>
+              <a:t>5/17/2013</a:t>
             </a:fld>
             <a:endParaRPr lang="en-US" dirty="0"/>
           </a:p>
@@ -533,7 +533,7 @@
             <a:fld id="{9B46F231-FB2B-4655-A644-E2477325E686}" type="datetimeFigureOut">
               <a:rPr lang="en-US"/>
               <a:pPr/>
-              <a:t>5/16/2013</a:t>
+              <a:t>5/17/2013</a:t>
             </a:fld>
             <a:endParaRPr lang="en-US" dirty="0"/>
           </a:p>
@@ -6276,8 +6276,27 @@
                   </a:schemeClr>
                 </a:solidFill>
               </a:rPr>
-              <a:t>Code-coverage over 95%</a:t>
-            </a:r>
+              <a:t>Code-coverage over </a:t>
+            </a:r>
+            <a:r>
+              <a:rPr lang="en-US" sz="3600" dirty="0" smtClean="0">
+                <a:solidFill>
+                  <a:schemeClr val="accent5">
+                    <a:lumMod val="20000"/>
+                    <a:lumOff val="80000"/>
+                  </a:schemeClr>
+                </a:solidFill>
+              </a:rPr>
+              <a:t>96%</a:t>
+            </a:r>
+            <a:endParaRPr lang="en-US" sz="3600" dirty="0" smtClean="0">
+              <a:solidFill>
+                <a:schemeClr val="accent5">
+                  <a:lumMod val="20000"/>
+                  <a:lumOff val="80000"/>
+                </a:schemeClr>
+              </a:solidFill>
+            </a:endParaRPr>
           </a:p>
           <a:p>
             <a:pPr lvl="1">
@@ -6357,18 +6376,19 @@
                   </a:schemeClr>
                 </a:solidFill>
               </a:rPr>
-              <a:t>Near all possibilities of king losing</a:t>
-            </a:r>
-            <a:endParaRPr lang="en-US" sz="3600" dirty="0">
-              <a:solidFill>
-                <a:schemeClr val="accent5">
-                  <a:lumMod val="20000"/>
-                  <a:lumOff val="80000"/>
-                </a:schemeClr>
-              </a:solidFill>
-              <a:latin typeface="Consolas" pitchFamily="49" charset="0"/>
-              <a:cs typeface="Consolas" pitchFamily="49" charset="0"/>
-            </a:endParaRPr>
+              <a:t>Near all possibilities of king </a:t>
+            </a:r>
+            <a:r>
+              <a:rPr lang="en-US" sz="3600" dirty="0" smtClean="0">
+                <a:solidFill>
+                  <a:schemeClr val="accent5">
+                    <a:lumMod val="20000"/>
+                    <a:lumOff val="80000"/>
+                  </a:schemeClr>
+                </a:solidFill>
+              </a:rPr>
+              <a:t>losing</a:t>
+            </a:r>
           </a:p>
         </p:txBody>
       </p:sp>
@@ -6691,7 +6711,15 @@
             </a:r>
             <a:r>
               <a:rPr lang="en-US" dirty="0" smtClean="0"/>
-              <a:t>– student @ Telerik Academy and volunteer helper in summer academy</a:t>
+              <a:t>– student @ Telerik Academy and volunteer </a:t>
+            </a:r>
+            <a:r>
+              <a:rPr lang="en-US" dirty="0" smtClean="0"/>
+              <a:t>assistant in </a:t>
+            </a:r>
+            <a:r>
+              <a:rPr lang="en-US" dirty="0" smtClean="0"/>
+              <a:t>summer academy</a:t>
             </a:r>
             <a:endParaRPr lang="en-US" dirty="0"/>
           </a:p>
@@ -7227,7 +7255,7 @@
           </a:lstStyle>
           <a:p>
             <a:r>
-              <a:rPr lang="en-US" sz="3200" dirty="0" smtClean="0">
+              <a:rPr lang="en-US" sz="3200" dirty="0" err="1" smtClean="0">
                 <a:solidFill>
                   <a:schemeClr val="accent5">
                     <a:lumMod val="40000"/>
@@ -7235,7 +7263,29 @@
                   </a:schemeClr>
                 </a:solidFill>
               </a:rPr>
-              <a:t>Nikolai Naidenov </a:t>
+              <a:t>Nikolay</a:t>
+            </a:r>
+            <a:r>
+              <a:rPr lang="en-US" sz="3200" dirty="0" smtClean="0">
+                <a:solidFill>
+                  <a:schemeClr val="accent5">
+                    <a:lumMod val="40000"/>
+                    <a:lumOff val="60000"/>
+                  </a:schemeClr>
+                </a:solidFill>
+              </a:rPr>
+              <a:t> </a:t>
+            </a:r>
+            <a:r>
+              <a:rPr lang="en-US" sz="3200" dirty="0" smtClean="0">
+                <a:solidFill>
+                  <a:schemeClr val="accent5">
+                    <a:lumMod val="40000"/>
+                    <a:lumOff val="60000"/>
+                  </a:schemeClr>
+                </a:solidFill>
+              </a:rPr>
+              <a:t>Naidenov </a:t>
             </a:r>
             <a:r>
               <a:rPr lang="en-US" dirty="0" smtClean="0"/>
@@ -7351,8 +7401,8 @@
         </p:nvSpPr>
         <p:spPr>
           <a:xfrm>
-            <a:off x="228600" y="990600"/>
-            <a:ext cx="8686800" cy="5715000"/>
+            <a:off x="304800" y="1257300"/>
+            <a:ext cx="8686800" cy="5029200"/>
           </a:xfrm>
         </p:spPr>
         <p:txBody>
@@ -7361,21 +7411,42 @@
           <a:p>
             <a:r>
               <a:rPr lang="en-US" dirty="0" smtClean="0"/>
-              <a:t>Smelly  code</a:t>
-            </a:r>
+              <a:t>Smelly </a:t>
+            </a:r>
+            <a:r>
+              <a:rPr lang="en-US" dirty="0" smtClean="0"/>
+              <a:t>code</a:t>
+            </a:r>
+            <a:endParaRPr lang="en-US" dirty="0" smtClean="0"/>
           </a:p>
           <a:p>
             <a:pPr lvl="1"/>
             <a:r>
               <a:rPr lang="en-US" dirty="0" smtClean="0"/>
-              <a:t>Used non-English variable, bad naming</a:t>
+              <a:t>Used non-English </a:t>
+            </a:r>
+            <a:r>
+              <a:rPr lang="en-US" dirty="0" smtClean="0"/>
+              <a:t>variables, </a:t>
+            </a:r>
+            <a:r>
+              <a:rPr lang="en-US" dirty="0" smtClean="0"/>
+              <a:t>bad naming</a:t>
             </a:r>
           </a:p>
           <a:p>
             <a:pPr lvl="1"/>
             <a:r>
               <a:rPr lang="en-US" dirty="0" smtClean="0"/>
-              <a:t>Bad indention, magic numbers</a:t>
+              <a:t>Bad </a:t>
+            </a:r>
+            <a:r>
+              <a:rPr lang="en-US" dirty="0" smtClean="0"/>
+              <a:t>indentation, </a:t>
+            </a:r>
+            <a:r>
+              <a:rPr lang="en-US" dirty="0" smtClean="0"/>
+              <a:t>magic numbers</a:t>
             </a:r>
           </a:p>
           <a:p>
@@ -7385,12 +7456,17 @@
             </a:r>
             <a:r>
               <a:rPr lang="en-US" dirty="0"/>
-              <a:t>coupling, </a:t>
+              <a:t>cohesion, </a:t>
             </a:r>
             <a:r>
               <a:rPr lang="en-US" dirty="0" smtClean="0"/>
-              <a:t>loose cohesion</a:t>
-            </a:r>
+              <a:t>loose </a:t>
+            </a:r>
+            <a:r>
+              <a:rPr lang="en-US" dirty="0" smtClean="0"/>
+              <a:t>coupling</a:t>
+            </a:r>
+            <a:endParaRPr lang="en-US" dirty="0" smtClean="0"/>
           </a:p>
           <a:p>
             <a:pPr lvl="1"/>
@@ -7876,8 +7952,13 @@
             </a:r>
             <a:r>
               <a:rPr lang="en-US" sz="2400" dirty="0" smtClean="0"/>
-              <a:t> – logic part</a:t>
-            </a:r>
+              <a:t> – </a:t>
+            </a:r>
+            <a:r>
+              <a:rPr lang="en-US" sz="2400" dirty="0" smtClean="0"/>
+              <a:t>implementation of main logic</a:t>
+            </a:r>
+            <a:endParaRPr lang="en-US" sz="2400" dirty="0" smtClean="0"/>
           </a:p>
           <a:p>
             <a:pPr marL="862013" lvl="1" indent="-514350">
@@ -7893,8 +7974,13 @@
             </a:r>
             <a:r>
               <a:rPr lang="en-US" sz="2400" dirty="0" smtClean="0"/>
-              <a:t> – game displaced on console</a:t>
-            </a:r>
+              <a:t> </a:t>
+            </a:r>
+            <a:r>
+              <a:rPr lang="en-US" sz="2400" dirty="0" smtClean="0"/>
+              <a:t>– game presentation</a:t>
+            </a:r>
+            <a:endParaRPr lang="en-US" sz="2400" dirty="0" smtClean="0"/>
           </a:p>
           <a:p>
             <a:pPr marL="862013" lvl="1" indent="-514350">
@@ -7937,7 +8023,11 @@
             </a:pPr>
             <a:r>
               <a:rPr lang="en-US" sz="2800" dirty="0" smtClean="0"/>
-              <a:t>Made code testable</a:t>
+              <a:t>Made code </a:t>
+            </a:r>
+            <a:r>
+              <a:rPr lang="en-US" sz="2800" dirty="0" smtClean="0"/>
+              <a:t>testable</a:t>
             </a:r>
           </a:p>
           <a:p>
@@ -7950,8 +8040,17 @@
             </a:pPr>
             <a:r>
               <a:rPr lang="en-US" sz="2800" dirty="0" smtClean="0"/>
-              <a:t>Full information about every single method refactoring in “documentation.docx”</a:t>
-            </a:r>
+              <a:t>Full information about every single method refactoring in </a:t>
+            </a:r>
+            <a:r>
+              <a:rPr lang="en-US" sz="2800" dirty="0"/>
+              <a:t>“RefactoringDocumentation.docx</a:t>
+            </a:r>
+            <a:r>
+              <a:rPr lang="en-US" sz="2800" dirty="0" smtClean="0"/>
+              <a:t>”</a:t>
+            </a:r>
+            <a:endParaRPr lang="en-US" sz="2800" dirty="0" smtClean="0"/>
           </a:p>
         </p:txBody>
       </p:sp>
@@ -8194,7 +8293,11 @@
             </a:pPr>
             <a:r>
               <a:rPr lang="en-US" sz="3600" dirty="0" smtClean="0"/>
-              <a:t>Everybody made at least 5 commits in Git repository</a:t>
+              <a:t>Everyone made </a:t>
+            </a:r>
+            <a:r>
+              <a:rPr lang="en-US" sz="3600" dirty="0" smtClean="0"/>
+              <a:t>at least 5 commits in Git repository</a:t>
             </a:r>
           </a:p>
           <a:p>

</xml_diff>